<commit_message>
Fix Windows encoding problem
</commit_message>
<xml_diff>
--- a/test/original/sample1.pptx
+++ b/test/original/sample1.pptx
@@ -260,7 +260,7 @@
           <a:p>
             <a:fld id="{766D20D2-48C5-4420-B145-354427682592}" type="datetimeFigureOut">
               <a:rPr kumimoji="1" lang="ja-JP" altLang="en-US" smtClean="0"/>
-              <a:t>2023/3/17</a:t>
+              <a:t>2023/3/23</a:t>
             </a:fld>
             <a:endParaRPr kumimoji="1" lang="ja-JP" altLang="en-US"/>
           </a:p>
@@ -490,7 +490,7 @@
           <a:p>
             <a:fld id="{766D20D2-48C5-4420-B145-354427682592}" type="datetimeFigureOut">
               <a:rPr kumimoji="1" lang="ja-JP" altLang="en-US" smtClean="0"/>
-              <a:t>2023/3/17</a:t>
+              <a:t>2023/3/23</a:t>
             </a:fld>
             <a:endParaRPr kumimoji="1" lang="ja-JP" altLang="en-US"/>
           </a:p>
@@ -730,7 +730,7 @@
           <a:p>
             <a:fld id="{766D20D2-48C5-4420-B145-354427682592}" type="datetimeFigureOut">
               <a:rPr kumimoji="1" lang="ja-JP" altLang="en-US" smtClean="0"/>
-              <a:t>2023/3/17</a:t>
+              <a:t>2023/3/23</a:t>
             </a:fld>
             <a:endParaRPr kumimoji="1" lang="ja-JP" altLang="en-US"/>
           </a:p>
@@ -960,7 +960,7 @@
           <a:p>
             <a:fld id="{766D20D2-48C5-4420-B145-354427682592}" type="datetimeFigureOut">
               <a:rPr kumimoji="1" lang="ja-JP" altLang="en-US" smtClean="0"/>
-              <a:t>2023/3/17</a:t>
+              <a:t>2023/3/23</a:t>
             </a:fld>
             <a:endParaRPr kumimoji="1" lang="ja-JP" altLang="en-US"/>
           </a:p>
@@ -1235,7 +1235,7 @@
           <a:p>
             <a:fld id="{766D20D2-48C5-4420-B145-354427682592}" type="datetimeFigureOut">
               <a:rPr kumimoji="1" lang="ja-JP" altLang="en-US" smtClean="0"/>
-              <a:t>2023/3/17</a:t>
+              <a:t>2023/3/23</a:t>
             </a:fld>
             <a:endParaRPr kumimoji="1" lang="ja-JP" altLang="en-US"/>
           </a:p>
@@ -1564,7 +1564,7 @@
           <a:p>
             <a:fld id="{766D20D2-48C5-4420-B145-354427682592}" type="datetimeFigureOut">
               <a:rPr kumimoji="1" lang="ja-JP" altLang="en-US" smtClean="0"/>
-              <a:t>2023/3/17</a:t>
+              <a:t>2023/3/23</a:t>
             </a:fld>
             <a:endParaRPr kumimoji="1" lang="ja-JP" altLang="en-US"/>
           </a:p>
@@ -2040,7 +2040,7 @@
           <a:p>
             <a:fld id="{766D20D2-48C5-4420-B145-354427682592}" type="datetimeFigureOut">
               <a:rPr kumimoji="1" lang="ja-JP" altLang="en-US" smtClean="0"/>
-              <a:t>2023/3/17</a:t>
+              <a:t>2023/3/23</a:t>
             </a:fld>
             <a:endParaRPr kumimoji="1" lang="ja-JP" altLang="en-US"/>
           </a:p>
@@ -2181,7 +2181,7 @@
           <a:p>
             <a:fld id="{766D20D2-48C5-4420-B145-354427682592}" type="datetimeFigureOut">
               <a:rPr kumimoji="1" lang="ja-JP" altLang="en-US" smtClean="0"/>
-              <a:t>2023/3/17</a:t>
+              <a:t>2023/3/23</a:t>
             </a:fld>
             <a:endParaRPr kumimoji="1" lang="ja-JP" altLang="en-US"/>
           </a:p>
@@ -2294,7 +2294,7 @@
           <a:p>
             <a:fld id="{766D20D2-48C5-4420-B145-354427682592}" type="datetimeFigureOut">
               <a:rPr kumimoji="1" lang="ja-JP" altLang="en-US" smtClean="0"/>
-              <a:t>2023/3/17</a:t>
+              <a:t>2023/3/23</a:t>
             </a:fld>
             <a:endParaRPr kumimoji="1" lang="ja-JP" altLang="en-US"/>
           </a:p>
@@ -2637,7 +2637,7 @@
           <a:p>
             <a:fld id="{766D20D2-48C5-4420-B145-354427682592}" type="datetimeFigureOut">
               <a:rPr kumimoji="1" lang="ja-JP" altLang="en-US" smtClean="0"/>
-              <a:t>2023/3/17</a:t>
+              <a:t>2023/3/23</a:t>
             </a:fld>
             <a:endParaRPr kumimoji="1" lang="ja-JP" altLang="en-US"/>
           </a:p>
@@ -2925,7 +2925,7 @@
           <a:p>
             <a:fld id="{766D20D2-48C5-4420-B145-354427682592}" type="datetimeFigureOut">
               <a:rPr kumimoji="1" lang="ja-JP" altLang="en-US" smtClean="0"/>
-              <a:t>2023/3/17</a:t>
+              <a:t>2023/3/23</a:t>
             </a:fld>
             <a:endParaRPr kumimoji="1" lang="ja-JP" altLang="en-US"/>
           </a:p>
@@ -3198,7 +3198,7 @@
           <a:p>
             <a:fld id="{766D20D2-48C5-4420-B145-354427682592}" type="datetimeFigureOut">
               <a:rPr kumimoji="1" lang="ja-JP" altLang="en-US" smtClean="0"/>
-              <a:t>2023/3/17</a:t>
+              <a:t>2023/3/23</a:t>
             </a:fld>
             <a:endParaRPr kumimoji="1" lang="ja-JP" altLang="en-US"/>
           </a:p>
@@ -3671,7 +3671,7 @@
           <a:p>
             <a:r>
               <a:rPr lang="ja-JP" altLang="en-US" dirty="0"/>
-              <a:t>メロスは激怒した。必ず、かの邪智暴虐の王を除かなければならぬと決意した。</a:t>
+              <a:t>メロスは激怒😡した。必ず、かの邪智暴虐の王を除かなければならぬと決意した。</a:t>
             </a:r>
             <a:endParaRPr lang="en-US" altLang="ja-JP" dirty="0"/>
           </a:p>
@@ -3790,7 +3790,7 @@
                 <a:ea typeface="メイリオ" panose="020B0604030504040204" pitchFamily="50" charset="-128"/>
                 <a:cs typeface="Calibri Light" panose="020F0302020204030204" pitchFamily="34" charset="0"/>
               </a:rPr>
-              <a:t>メロスは激怒した。必ず、かの邪智暴虐の王を除かなければならぬと決意した。</a:t>
+              <a:t>メロスは激怒😡した。必ず、かの邪智暴虐の王を除かなければならぬと決意した。</a:t>
             </a:r>
             <a:endParaRPr lang="en-US" altLang="ja-JP" dirty="0">
               <a:latin typeface="Calibri Light" panose="020F0302020204030204" pitchFamily="34" charset="0"/>

</xml_diff>

<commit_message>
Add replacement for slide masters fonts
</commit_message>
<xml_diff>
--- a/test/original/sample1.pptx
+++ b/test/original/sample1.pptx
@@ -260,7 +260,7 @@
           <a:p>
             <a:fld id="{766D20D2-48C5-4420-B145-354427682592}" type="datetimeFigureOut">
               <a:rPr kumimoji="1" lang="ja-JP" altLang="en-US" smtClean="0"/>
-              <a:t>2023/3/27</a:t>
+              <a:t>2023/4/3</a:t>
             </a:fld>
             <a:endParaRPr kumimoji="1" lang="ja-JP" altLang="en-US"/>
           </a:p>
@@ -490,7 +490,7 @@
           <a:p>
             <a:fld id="{766D20D2-48C5-4420-B145-354427682592}" type="datetimeFigureOut">
               <a:rPr kumimoji="1" lang="ja-JP" altLang="en-US" smtClean="0"/>
-              <a:t>2023/3/27</a:t>
+              <a:t>2023/4/3</a:t>
             </a:fld>
             <a:endParaRPr kumimoji="1" lang="ja-JP" altLang="en-US"/>
           </a:p>
@@ -730,7 +730,7 @@
           <a:p>
             <a:fld id="{766D20D2-48C5-4420-B145-354427682592}" type="datetimeFigureOut">
               <a:rPr kumimoji="1" lang="ja-JP" altLang="en-US" smtClean="0"/>
-              <a:t>2023/3/27</a:t>
+              <a:t>2023/4/3</a:t>
             </a:fld>
             <a:endParaRPr kumimoji="1" lang="ja-JP" altLang="en-US"/>
           </a:p>
@@ -871,67 +871,67 @@
           <a:p>
             <a:pPr lvl="0"/>
             <a:r>
-              <a:rPr kumimoji="1" lang="ja-JP" altLang="en-US"/>
+              <a:rPr kumimoji="1" lang="ja-JP" altLang="en-US" dirty="0"/>
               <a:t>マスター テキストの書式設定</a:t>
             </a:r>
           </a:p>
           <a:p>
             <a:pPr lvl="1"/>
             <a:r>
-              <a:rPr kumimoji="1" lang="ja-JP" altLang="en-US"/>
+              <a:rPr kumimoji="1" lang="ja-JP" altLang="en-US" dirty="0"/>
               <a:t>第 </a:t>
             </a:r>
             <a:r>
-              <a:rPr kumimoji="1" lang="en-US" altLang="ja-JP"/>
+              <a:rPr kumimoji="1" lang="en-US" altLang="ja-JP" dirty="0"/>
               <a:t>2 </a:t>
             </a:r>
             <a:r>
-              <a:rPr kumimoji="1" lang="ja-JP" altLang="en-US"/>
+              <a:rPr kumimoji="1" lang="ja-JP" altLang="en-US" dirty="0"/>
               <a:t>レベル</a:t>
             </a:r>
           </a:p>
           <a:p>
             <a:pPr lvl="2"/>
             <a:r>
-              <a:rPr kumimoji="1" lang="ja-JP" altLang="en-US"/>
+              <a:rPr kumimoji="1" lang="ja-JP" altLang="en-US" dirty="0"/>
               <a:t>第 </a:t>
             </a:r>
             <a:r>
-              <a:rPr kumimoji="1" lang="en-US" altLang="ja-JP"/>
+              <a:rPr kumimoji="1" lang="en-US" altLang="ja-JP" dirty="0"/>
               <a:t>3 </a:t>
             </a:r>
             <a:r>
-              <a:rPr kumimoji="1" lang="ja-JP" altLang="en-US"/>
+              <a:rPr kumimoji="1" lang="ja-JP" altLang="en-US" dirty="0"/>
               <a:t>レベル</a:t>
             </a:r>
           </a:p>
           <a:p>
             <a:pPr lvl="3"/>
             <a:r>
-              <a:rPr kumimoji="1" lang="ja-JP" altLang="en-US"/>
+              <a:rPr kumimoji="1" lang="ja-JP" altLang="en-US" dirty="0"/>
               <a:t>第 </a:t>
             </a:r>
             <a:r>
-              <a:rPr kumimoji="1" lang="en-US" altLang="ja-JP"/>
+              <a:rPr kumimoji="1" lang="en-US" altLang="ja-JP" dirty="0"/>
               <a:t>4 </a:t>
             </a:r>
             <a:r>
-              <a:rPr kumimoji="1" lang="ja-JP" altLang="en-US"/>
+              <a:rPr kumimoji="1" lang="ja-JP" altLang="en-US" dirty="0"/>
               <a:t>レベル</a:t>
             </a:r>
           </a:p>
           <a:p>
             <a:pPr lvl="4"/>
             <a:r>
-              <a:rPr kumimoji="1" lang="ja-JP" altLang="en-US"/>
+              <a:rPr kumimoji="1" lang="ja-JP" altLang="en-US" dirty="0"/>
               <a:t>第 </a:t>
             </a:r>
             <a:r>
-              <a:rPr kumimoji="1" lang="en-US" altLang="ja-JP"/>
+              <a:rPr kumimoji="1" lang="en-US" altLang="ja-JP" dirty="0"/>
               <a:t>5 </a:t>
             </a:r>
             <a:r>
-              <a:rPr kumimoji="1" lang="ja-JP" altLang="en-US"/>
+              <a:rPr kumimoji="1" lang="ja-JP" altLang="en-US" dirty="0"/>
               <a:t>レベル</a:t>
             </a:r>
           </a:p>
@@ -960,7 +960,7 @@
           <a:p>
             <a:fld id="{766D20D2-48C5-4420-B145-354427682592}" type="datetimeFigureOut">
               <a:rPr kumimoji="1" lang="ja-JP" altLang="en-US" smtClean="0"/>
-              <a:t>2023/3/27</a:t>
+              <a:t>2023/4/3</a:t>
             </a:fld>
             <a:endParaRPr kumimoji="1" lang="ja-JP" altLang="en-US"/>
           </a:p>
@@ -1235,7 +1235,7 @@
           <a:p>
             <a:fld id="{766D20D2-48C5-4420-B145-354427682592}" type="datetimeFigureOut">
               <a:rPr kumimoji="1" lang="ja-JP" altLang="en-US" smtClean="0"/>
-              <a:t>2023/3/27</a:t>
+              <a:t>2023/4/3</a:t>
             </a:fld>
             <a:endParaRPr kumimoji="1" lang="ja-JP" altLang="en-US"/>
           </a:p>
@@ -1564,7 +1564,7 @@
           <a:p>
             <a:fld id="{766D20D2-48C5-4420-B145-354427682592}" type="datetimeFigureOut">
               <a:rPr kumimoji="1" lang="ja-JP" altLang="en-US" smtClean="0"/>
-              <a:t>2023/3/27</a:t>
+              <a:t>2023/4/3</a:t>
             </a:fld>
             <a:endParaRPr kumimoji="1" lang="ja-JP" altLang="en-US"/>
           </a:p>
@@ -2040,7 +2040,7 @@
           <a:p>
             <a:fld id="{766D20D2-48C5-4420-B145-354427682592}" type="datetimeFigureOut">
               <a:rPr kumimoji="1" lang="ja-JP" altLang="en-US" smtClean="0"/>
-              <a:t>2023/3/27</a:t>
+              <a:t>2023/4/3</a:t>
             </a:fld>
             <a:endParaRPr kumimoji="1" lang="ja-JP" altLang="en-US"/>
           </a:p>
@@ -2181,7 +2181,7 @@
           <a:p>
             <a:fld id="{766D20D2-48C5-4420-B145-354427682592}" type="datetimeFigureOut">
               <a:rPr kumimoji="1" lang="ja-JP" altLang="en-US" smtClean="0"/>
-              <a:t>2023/3/27</a:t>
+              <a:t>2023/4/3</a:t>
             </a:fld>
             <a:endParaRPr kumimoji="1" lang="ja-JP" altLang="en-US"/>
           </a:p>
@@ -2294,7 +2294,7 @@
           <a:p>
             <a:fld id="{766D20D2-48C5-4420-B145-354427682592}" type="datetimeFigureOut">
               <a:rPr kumimoji="1" lang="ja-JP" altLang="en-US" smtClean="0"/>
-              <a:t>2023/3/27</a:t>
+              <a:t>2023/4/3</a:t>
             </a:fld>
             <a:endParaRPr kumimoji="1" lang="ja-JP" altLang="en-US"/>
           </a:p>
@@ -2637,7 +2637,7 @@
           <a:p>
             <a:fld id="{766D20D2-48C5-4420-B145-354427682592}" type="datetimeFigureOut">
               <a:rPr kumimoji="1" lang="ja-JP" altLang="en-US" smtClean="0"/>
-              <a:t>2023/3/27</a:t>
+              <a:t>2023/4/3</a:t>
             </a:fld>
             <a:endParaRPr kumimoji="1" lang="ja-JP" altLang="en-US"/>
           </a:p>
@@ -2925,7 +2925,7 @@
           <a:p>
             <a:fld id="{766D20D2-48C5-4420-B145-354427682592}" type="datetimeFigureOut">
               <a:rPr kumimoji="1" lang="ja-JP" altLang="en-US" smtClean="0"/>
-              <a:t>2023/3/27</a:t>
+              <a:t>2023/4/3</a:t>
             </a:fld>
             <a:endParaRPr kumimoji="1" lang="ja-JP" altLang="en-US"/>
           </a:p>
@@ -3091,67 +3091,67 @@
           <a:p>
             <a:pPr lvl="0"/>
             <a:r>
-              <a:rPr kumimoji="1" lang="ja-JP" altLang="en-US"/>
+              <a:rPr kumimoji="1" lang="ja-JP" altLang="en-US" dirty="0"/>
               <a:t>マスター テキストの書式設定</a:t>
             </a:r>
           </a:p>
           <a:p>
             <a:pPr lvl="1"/>
             <a:r>
-              <a:rPr kumimoji="1" lang="ja-JP" altLang="en-US"/>
+              <a:rPr kumimoji="1" lang="ja-JP" altLang="en-US" dirty="0"/>
               <a:t>第 </a:t>
             </a:r>
             <a:r>
-              <a:rPr kumimoji="1" lang="en-US" altLang="ja-JP"/>
+              <a:rPr kumimoji="1" lang="en-US" altLang="ja-JP" dirty="0"/>
               <a:t>2 </a:t>
             </a:r>
             <a:r>
-              <a:rPr kumimoji="1" lang="ja-JP" altLang="en-US"/>
+              <a:rPr kumimoji="1" lang="ja-JP" altLang="en-US" dirty="0"/>
               <a:t>レベル</a:t>
             </a:r>
           </a:p>
           <a:p>
             <a:pPr lvl="2"/>
             <a:r>
-              <a:rPr kumimoji="1" lang="ja-JP" altLang="en-US"/>
+              <a:rPr kumimoji="1" lang="ja-JP" altLang="en-US" dirty="0"/>
               <a:t>第 </a:t>
             </a:r>
             <a:r>
-              <a:rPr kumimoji="1" lang="en-US" altLang="ja-JP"/>
+              <a:rPr kumimoji="1" lang="en-US" altLang="ja-JP" dirty="0"/>
               <a:t>3 </a:t>
             </a:r>
             <a:r>
-              <a:rPr kumimoji="1" lang="ja-JP" altLang="en-US"/>
+              <a:rPr kumimoji="1" lang="ja-JP" altLang="en-US" dirty="0"/>
               <a:t>レベル</a:t>
             </a:r>
           </a:p>
           <a:p>
             <a:pPr lvl="3"/>
             <a:r>
-              <a:rPr kumimoji="1" lang="ja-JP" altLang="en-US"/>
+              <a:rPr kumimoji="1" lang="ja-JP" altLang="en-US" dirty="0"/>
               <a:t>第 </a:t>
             </a:r>
             <a:r>
-              <a:rPr kumimoji="1" lang="en-US" altLang="ja-JP"/>
+              <a:rPr kumimoji="1" lang="en-US" altLang="ja-JP" dirty="0"/>
               <a:t>4 </a:t>
             </a:r>
             <a:r>
-              <a:rPr kumimoji="1" lang="ja-JP" altLang="en-US"/>
+              <a:rPr kumimoji="1" lang="ja-JP" altLang="en-US" dirty="0"/>
               <a:t>レベル</a:t>
             </a:r>
           </a:p>
           <a:p>
             <a:pPr lvl="4"/>
             <a:r>
-              <a:rPr kumimoji="1" lang="ja-JP" altLang="en-US"/>
+              <a:rPr kumimoji="1" lang="ja-JP" altLang="en-US" dirty="0"/>
               <a:t>第 </a:t>
             </a:r>
             <a:r>
-              <a:rPr kumimoji="1" lang="en-US" altLang="ja-JP"/>
+              <a:rPr kumimoji="1" lang="en-US" altLang="ja-JP" dirty="0"/>
               <a:t>5 </a:t>
             </a:r>
             <a:r>
-              <a:rPr kumimoji="1" lang="ja-JP" altLang="en-US"/>
+              <a:rPr kumimoji="1" lang="ja-JP" altLang="en-US" dirty="0"/>
               <a:t>レベル</a:t>
             </a:r>
           </a:p>
@@ -3198,7 +3198,7 @@
           <a:p>
             <a:fld id="{766D20D2-48C5-4420-B145-354427682592}" type="datetimeFigureOut">
               <a:rPr kumimoji="1" lang="ja-JP" altLang="en-US" smtClean="0"/>
-              <a:t>2023/3/27</a:t>
+              <a:t>2023/4/3</a:t>
             </a:fld>
             <a:endParaRPr kumimoji="1" lang="ja-JP" altLang="en-US"/>
           </a:p>
@@ -3367,8 +3367,8 @@
           <a:solidFill>
             <a:schemeClr val="tx1"/>
           </a:solidFill>
-          <a:latin typeface="+mn-lt"/>
-          <a:ea typeface="+mn-ea"/>
+          <a:latin typeface="+mj-lt"/>
+          <a:ea typeface="+mj-ea"/>
           <a:cs typeface="+mn-cs"/>
         </a:defRPr>
       </a:lvl2pPr>
@@ -3676,9 +3676,24 @@
             <a:endParaRPr lang="en-US" altLang="ja-JP" dirty="0"/>
           </a:p>
           <a:p>
+            <a:pPr lvl="1"/>
+            <a:r>
+              <a:rPr lang="ja-JP" altLang="en-US" dirty="0"/>
+              <a:t>メロスには政治がわからぬ。メロスは、村の牧人である。</a:t>
+            </a:r>
+            <a:endParaRPr lang="en-US" altLang="ja-JP" dirty="0"/>
+          </a:p>
+          <a:p>
             <a:r>
               <a:rPr lang="en-US" altLang="ja-JP" dirty="0"/>
               <a:t>Alice was beginning to get very tired of sitting by her sister on the bank, and of having nothing to do.</a:t>
+            </a:r>
+          </a:p>
+          <a:p>
+            <a:pPr lvl="1"/>
+            <a:r>
+              <a:rPr lang="en-US" altLang="ja-JP" dirty="0"/>
+              <a:t>Once or twice she had peeped into the book her sister was reading, but it had no pictures or conversations in it, “and what is the use of a book,” thought Alice, “without pictures or conversations?”</a:t>
             </a:r>
             <a:endParaRPr lang="ja-JP" altLang="en-US" dirty="0"/>
           </a:p>
@@ -3792,6 +3807,22 @@
             </a:endParaRPr>
           </a:p>
           <a:p>
+            <a:pPr lvl="1"/>
+            <a:r>
+              <a:rPr lang="ja-JP" altLang="en-US" dirty="0">
+                <a:latin typeface="Calibri Light" panose="020F0302020204030204" pitchFamily="34" charset="0"/>
+                <a:ea typeface="メイリオ" panose="020B0604030504040204" pitchFamily="50" charset="-128"/>
+                <a:cs typeface="Calibri Light" panose="020F0302020204030204" pitchFamily="34" charset="0"/>
+              </a:rPr>
+              <a:t>メロスには政治がわからぬ。メロスは、村の牧人である。</a:t>
+            </a:r>
+            <a:endParaRPr lang="en-US" altLang="ja-JP" dirty="0">
+              <a:latin typeface="Calibri Light" panose="020F0302020204030204" pitchFamily="34" charset="0"/>
+              <a:ea typeface="メイリオ" panose="020B0604030504040204" pitchFamily="50" charset="-128"/>
+              <a:cs typeface="Calibri Light" panose="020F0302020204030204" pitchFamily="34" charset="0"/>
+            </a:endParaRPr>
+          </a:p>
+          <a:p>
             <a:r>
               <a:rPr lang="en-US" altLang="ja-JP" dirty="0">
                 <a:latin typeface="Calibri Light" panose="020F0302020204030204" pitchFamily="34" charset="0"/>
@@ -3800,11 +3831,17 @@
               </a:rPr>
               <a:t>Alice was beginning to get very tired of sitting by her sister on the bank, and of having nothing to do.</a:t>
             </a:r>
-            <a:endParaRPr lang="ja-JP" altLang="en-US" dirty="0">
-              <a:latin typeface="Calibri Light" panose="020F0302020204030204" pitchFamily="34" charset="0"/>
-              <a:ea typeface="メイリオ" panose="020B0604030504040204" pitchFamily="50" charset="-128"/>
-              <a:cs typeface="Calibri Light" panose="020F0302020204030204" pitchFamily="34" charset="0"/>
-            </a:endParaRPr>
+          </a:p>
+          <a:p>
+            <a:pPr lvl="1"/>
+            <a:r>
+              <a:rPr lang="en-US" altLang="ja-JP" dirty="0">
+                <a:latin typeface="Calibri Light" panose="020F0302020204030204" pitchFamily="34" charset="0"/>
+                <a:ea typeface="メイリオ" panose="020B0604030504040204" pitchFamily="50" charset="-128"/>
+                <a:cs typeface="Calibri Light" panose="020F0302020204030204" pitchFamily="34" charset="0"/>
+              </a:rPr>
+              <a:t>Once or twice she had peeped into the book her sister was reading, but it had no pictures or conversations in it, “and what is the use of a book,” thought Alice, “without pictures or conversations?”</a:t>
+            </a:r>
           </a:p>
         </p:txBody>
       </p:sp>

</xml_diff>